<commit_message>
update: change feat names
</commit_message>
<xml_diff>
--- a/rpaa-banking-project-client.pptx
+++ b/rpaa-banking-project-client.pptx
@@ -229,7 +229,7 @@
           <a:p>
             <a:fld id="{E6D8D6F4-D9DC-426F-A3F0-47CB7138BF19}" type="datetimeFigureOut">
               <a:rPr lang="en-US" smtClean="0"/>
-              <a:t>1/27/24</a:t>
+              <a:t>2/24/24</a:t>
             </a:fld>
             <a:endParaRPr lang="en-US"/>
           </a:p>
@@ -410,7 +410,7 @@
           <a:p>
             <a:fld id="{AAAD3BDB-9152-44D2-BBA7-12A4D9CD7CC3}" type="datetimeFigureOut">
               <a:rPr lang="tr-TR" smtClean="0"/>
-              <a:t>27.01.2024</a:t>
+              <a:t>24.02.2024</a:t>
             </a:fld>
             <a:endParaRPr lang="tr-TR"/>
           </a:p>
@@ -2669,7 +2669,7 @@
           <a:p>
             <a:fld id="{5C2533C5-1A4F-F742-BC5B-F92149A0ED3E}" type="datetime1">
               <a:rPr lang="tr-TR" smtClean="0"/>
-              <a:t>27.01.2024</a:t>
+              <a:t>24.02.2024</a:t>
             </a:fld>
             <a:endParaRPr lang="tr-TR"/>
           </a:p>
@@ -2869,7 +2869,7 @@
           <a:p>
             <a:fld id="{9F3BDF1E-A321-2D40-A520-FEA2D4C5C3D6}" type="datetime1">
               <a:rPr lang="tr-TR" smtClean="0"/>
-              <a:t>27.01.2024</a:t>
+              <a:t>24.02.2024</a:t>
             </a:fld>
             <a:endParaRPr lang="tr-TR"/>
           </a:p>
@@ -3079,7 +3079,7 @@
           <a:p>
             <a:fld id="{CB109D93-1BEC-634F-99E3-0282D47E614A}" type="datetime1">
               <a:rPr lang="tr-TR" smtClean="0"/>
-              <a:t>27.01.2024</a:t>
+              <a:t>24.02.2024</a:t>
             </a:fld>
             <a:endParaRPr lang="tr-TR"/>
           </a:p>
@@ -3279,7 +3279,7 @@
           <a:p>
             <a:fld id="{54DBB6F2-3BA4-7A44-91B8-59190EF92C1C}" type="datetime1">
               <a:rPr lang="tr-TR" smtClean="0"/>
-              <a:t>27.01.2024</a:t>
+              <a:t>24.02.2024</a:t>
             </a:fld>
             <a:endParaRPr lang="tr-TR"/>
           </a:p>
@@ -3555,7 +3555,7 @@
           <a:p>
             <a:fld id="{79F6F9A8-A6D9-B148-AD9E-438BCB45A456}" type="datetime1">
               <a:rPr lang="tr-TR" smtClean="0"/>
-              <a:t>27.01.2024</a:t>
+              <a:t>24.02.2024</a:t>
             </a:fld>
             <a:endParaRPr lang="tr-TR"/>
           </a:p>
@@ -3823,7 +3823,7 @@
           <a:p>
             <a:fld id="{59B08467-DC5A-9F45-95F4-67EF79C65997}" type="datetime1">
               <a:rPr lang="tr-TR" smtClean="0"/>
-              <a:t>27.01.2024</a:t>
+              <a:t>24.02.2024</a:t>
             </a:fld>
             <a:endParaRPr lang="tr-TR"/>
           </a:p>
@@ -4238,7 +4238,7 @@
           <a:p>
             <a:fld id="{42297CE6-7B39-8144-B7B2-13977B449CDB}" type="datetime1">
               <a:rPr lang="tr-TR" smtClean="0"/>
-              <a:t>27.01.2024</a:t>
+              <a:t>24.02.2024</a:t>
             </a:fld>
             <a:endParaRPr lang="tr-TR"/>
           </a:p>
@@ -4380,7 +4380,7 @@
           <a:p>
             <a:fld id="{51D4AC26-CD9F-7A47-B66E-0A76FD5A9306}" type="datetime1">
               <a:rPr lang="tr-TR" smtClean="0"/>
-              <a:t>27.01.2024</a:t>
+              <a:t>24.02.2024</a:t>
             </a:fld>
             <a:endParaRPr lang="tr-TR"/>
           </a:p>
@@ -4493,7 +4493,7 @@
           <a:p>
             <a:fld id="{A91C0CCC-02C4-D548-A3D2-5533AD2ADD56}" type="datetime1">
               <a:rPr lang="tr-TR" smtClean="0"/>
-              <a:t>27.01.2024</a:t>
+              <a:t>24.02.2024</a:t>
             </a:fld>
             <a:endParaRPr lang="tr-TR"/>
           </a:p>
@@ -4806,7 +4806,7 @@
           <a:p>
             <a:fld id="{B871B4E4-67CA-1C43-B480-29F2A9896CA9}" type="datetime1">
               <a:rPr lang="tr-TR" smtClean="0"/>
-              <a:t>27.01.2024</a:t>
+              <a:t>24.02.2024</a:t>
             </a:fld>
             <a:endParaRPr lang="tr-TR"/>
           </a:p>
@@ -5095,7 +5095,7 @@
           <a:p>
             <a:fld id="{C9624BF0-42D4-FF49-A79F-CE1357EAA8AD}" type="datetime1">
               <a:rPr lang="tr-TR" smtClean="0"/>
-              <a:t>27.01.2024</a:t>
+              <a:t>24.02.2024</a:t>
             </a:fld>
             <a:endParaRPr lang="tr-TR"/>
           </a:p>
@@ -5338,7 +5338,7 @@
           <a:p>
             <a:fld id="{DF424AF5-3950-2640-81C5-676182052EA4}" type="datetime1">
               <a:rPr lang="tr-TR" smtClean="0"/>
-              <a:t>27.01.2024</a:t>
+              <a:t>24.02.2024</a:t>
             </a:fld>
             <a:endParaRPr lang="tr-TR"/>
           </a:p>
@@ -7230,46 +7230,12 @@
           </a:p>
         </p:txBody>
       </p:sp>
-      <p:sp>
-        <p:nvSpPr>
-          <p:cNvPr id="3" name="Slide Number Placeholder 2">
-            <a:extLst>
-              <a:ext uri="{FF2B5EF4-FFF2-40B4-BE49-F238E27FC236}">
-                <a16:creationId xmlns:a16="http://schemas.microsoft.com/office/drawing/2014/main" id="{E025FAC5-4886-6BAC-D61A-1B0EE840F457}"/>
-              </a:ext>
-            </a:extLst>
-          </p:cNvPr>
-          <p:cNvSpPr>
-            <a:spLocks noGrp="1"/>
-          </p:cNvSpPr>
-          <p:nvPr>
-            <p:ph type="sldNum" sz="quarter" idx="12"/>
-          </p:nvPr>
-        </p:nvSpPr>
-        <p:spPr>
-          <a:xfrm>
-            <a:off x="9333052" y="6538928"/>
-            <a:ext cx="2743200" cy="153888"/>
-          </a:xfrm>
-        </p:spPr>
-        <p:txBody>
-          <a:bodyPr/>
-          <a:lstStyle/>
-          <a:p>
-            <a:fld id="{C5F86065-5C12-4F8A-8791-CC7ADD0E19AC}" type="slidenum">
-              <a:rPr lang="tr-TR" smtClean="0"/>
-              <a:t>12</a:t>
-            </a:fld>
-            <a:endParaRPr lang="tr-TR" dirty="0"/>
-          </a:p>
-        </p:txBody>
-      </p:sp>
       <p:pic>
         <p:nvPicPr>
-          <p:cNvPr id="7" name="Picture 6">
-            <a:extLst>
-              <a:ext uri="{FF2B5EF4-FFF2-40B4-BE49-F238E27FC236}">
-                <a16:creationId xmlns:a16="http://schemas.microsoft.com/office/drawing/2014/main" id="{8C5414A3-8524-94E9-4723-04EA3D1676D0}"/>
+          <p:cNvPr id="4" name="Picture 3">
+            <a:extLst>
+              <a:ext uri="{FF2B5EF4-FFF2-40B4-BE49-F238E27FC236}">
+                <a16:creationId xmlns:a16="http://schemas.microsoft.com/office/drawing/2014/main" id="{68319282-A637-A145-420D-A73743552598}"/>
               </a:ext>
             </a:extLst>
           </p:cNvPr>
@@ -7296,6 +7262,40 @@
       </p:pic>
       <p:sp>
         <p:nvSpPr>
+          <p:cNvPr id="3" name="Slide Number Placeholder 2">
+            <a:extLst>
+              <a:ext uri="{FF2B5EF4-FFF2-40B4-BE49-F238E27FC236}">
+                <a16:creationId xmlns:a16="http://schemas.microsoft.com/office/drawing/2014/main" id="{E025FAC5-4886-6BAC-D61A-1B0EE840F457}"/>
+              </a:ext>
+            </a:extLst>
+          </p:cNvPr>
+          <p:cNvSpPr>
+            <a:spLocks noGrp="1"/>
+          </p:cNvSpPr>
+          <p:nvPr>
+            <p:ph type="sldNum" sz="quarter" idx="12"/>
+          </p:nvPr>
+        </p:nvSpPr>
+        <p:spPr>
+          <a:xfrm>
+            <a:off x="9333052" y="6538928"/>
+            <a:ext cx="2743200" cy="153888"/>
+          </a:xfrm>
+        </p:spPr>
+        <p:txBody>
+          <a:bodyPr/>
+          <a:lstStyle/>
+          <a:p>
+            <a:fld id="{C5F86065-5C12-4F8A-8791-CC7ADD0E19AC}" type="slidenum">
+              <a:rPr lang="tr-TR" smtClean="0"/>
+              <a:t>12</a:t>
+            </a:fld>
+            <a:endParaRPr lang="tr-TR" dirty="0"/>
+          </a:p>
+        </p:txBody>
+      </p:sp>
+      <p:sp>
+        <p:nvSpPr>
           <p:cNvPr id="5" name="TextBox 4">
             <a:extLst>
               <a:ext uri="{FF2B5EF4-FFF2-40B4-BE49-F238E27FC236}">
@@ -7332,7 +7332,7 @@
             </a:r>
             <a:r>
               <a:rPr lang="en-US" sz="1600" dirty="0" err="1"/>
-              <a:t>cat_number_client_calls_from_ING</a:t>
+              <a:t>cat_number_client_calls_from_BANK</a:t>
             </a:r>
             <a:r>
               <a:rPr lang="en-US" sz="1600" dirty="0"/>
@@ -7388,7 +7388,7 @@
             </a:r>
             <a:r>
               <a:rPr lang="en-US" sz="1600" dirty="0" err="1"/>
-              <a:t>cat_number_client_calls_from_ING</a:t>
+              <a:t>cat_number_client_calls_from_BANK</a:t>
             </a:r>
             <a:r>
               <a:rPr lang="en-US" sz="1600" dirty="0"/>
@@ -7402,138 +7402,6 @@
               <a:rPr lang="en-US" sz="1600" dirty="0"/>
               <a:t> model, utilized 4 features with the highest correlation to enhance its predictive capabilities.</a:t>
             </a:r>
-          </a:p>
-        </p:txBody>
-      </p:sp>
-      <p:sp>
-        <p:nvSpPr>
-          <p:cNvPr id="8" name="Slide Number Placeholder 2">
-            <a:extLst>
-              <a:ext uri="{FF2B5EF4-FFF2-40B4-BE49-F238E27FC236}">
-                <a16:creationId xmlns:a16="http://schemas.microsoft.com/office/drawing/2014/main" id="{1590808C-BC3E-E651-611F-8C1D85E517C1}"/>
-              </a:ext>
-            </a:extLst>
-          </p:cNvPr>
-          <p:cNvSpPr txBox="1">
-            <a:spLocks/>
-          </p:cNvSpPr>
-          <p:nvPr/>
-        </p:nvSpPr>
-        <p:spPr>
-          <a:xfrm>
-            <a:off x="9217304" y="6433309"/>
-            <a:ext cx="2743200" cy="365125"/>
-          </a:xfrm>
-          <a:prstGeom prst="rect">
-            <a:avLst/>
-          </a:prstGeom>
-        </p:spPr>
-        <p:txBody>
-          <a:bodyPr vert="horz" lIns="91440" tIns="45720" rIns="91440" bIns="45720" rtlCol="0" anchor="ctr"/>
-          <a:lstStyle>
-            <a:defPPr>
-              <a:defRPr lang="tr-TR"/>
-            </a:defPPr>
-            <a:lvl1pPr marL="0" algn="r" defTabSz="914400" rtl="0" eaLnBrk="1" latinLnBrk="0" hangingPunct="1">
-              <a:defRPr sz="1200" kern="1200">
-                <a:solidFill>
-                  <a:schemeClr val="tx1">
-                    <a:tint val="75000"/>
-                  </a:schemeClr>
-                </a:solidFill>
-                <a:latin typeface="+mn-lt"/>
-                <a:ea typeface="+mn-ea"/>
-                <a:cs typeface="+mn-cs"/>
-              </a:defRPr>
-            </a:lvl1pPr>
-            <a:lvl2pPr marL="457200" algn="l" defTabSz="914400" rtl="0" eaLnBrk="1" latinLnBrk="0" hangingPunct="1">
-              <a:defRPr sz="1800" kern="1200">
-                <a:solidFill>
-                  <a:schemeClr val="tx1"/>
-                </a:solidFill>
-                <a:latin typeface="+mn-lt"/>
-                <a:ea typeface="+mn-ea"/>
-                <a:cs typeface="+mn-cs"/>
-              </a:defRPr>
-            </a:lvl2pPr>
-            <a:lvl3pPr marL="914400" algn="l" defTabSz="914400" rtl="0" eaLnBrk="1" latinLnBrk="0" hangingPunct="1">
-              <a:defRPr sz="1800" kern="1200">
-                <a:solidFill>
-                  <a:schemeClr val="tx1"/>
-                </a:solidFill>
-                <a:latin typeface="+mn-lt"/>
-                <a:ea typeface="+mn-ea"/>
-                <a:cs typeface="+mn-cs"/>
-              </a:defRPr>
-            </a:lvl3pPr>
-            <a:lvl4pPr marL="1371600" algn="l" defTabSz="914400" rtl="0" eaLnBrk="1" latinLnBrk="0" hangingPunct="1">
-              <a:defRPr sz="1800" kern="1200">
-                <a:solidFill>
-                  <a:schemeClr val="tx1"/>
-                </a:solidFill>
-                <a:latin typeface="+mn-lt"/>
-                <a:ea typeface="+mn-ea"/>
-                <a:cs typeface="+mn-cs"/>
-              </a:defRPr>
-            </a:lvl4pPr>
-            <a:lvl5pPr marL="1828800" algn="l" defTabSz="914400" rtl="0" eaLnBrk="1" latinLnBrk="0" hangingPunct="1">
-              <a:defRPr sz="1800" kern="1200">
-                <a:solidFill>
-                  <a:schemeClr val="tx1"/>
-                </a:solidFill>
-                <a:latin typeface="+mn-lt"/>
-                <a:ea typeface="+mn-ea"/>
-                <a:cs typeface="+mn-cs"/>
-              </a:defRPr>
-            </a:lvl5pPr>
-            <a:lvl6pPr marL="2286000" algn="l" defTabSz="914400" rtl="0" eaLnBrk="1" latinLnBrk="0" hangingPunct="1">
-              <a:defRPr sz="1800" kern="1200">
-                <a:solidFill>
-                  <a:schemeClr val="tx1"/>
-                </a:solidFill>
-                <a:latin typeface="+mn-lt"/>
-                <a:ea typeface="+mn-ea"/>
-                <a:cs typeface="+mn-cs"/>
-              </a:defRPr>
-            </a:lvl6pPr>
-            <a:lvl7pPr marL="2743200" algn="l" defTabSz="914400" rtl="0" eaLnBrk="1" latinLnBrk="0" hangingPunct="1">
-              <a:defRPr sz="1800" kern="1200">
-                <a:solidFill>
-                  <a:schemeClr val="tx1"/>
-                </a:solidFill>
-                <a:latin typeface="+mn-lt"/>
-                <a:ea typeface="+mn-ea"/>
-                <a:cs typeface="+mn-cs"/>
-              </a:defRPr>
-            </a:lvl7pPr>
-            <a:lvl8pPr marL="3200400" algn="l" defTabSz="914400" rtl="0" eaLnBrk="1" latinLnBrk="0" hangingPunct="1">
-              <a:defRPr sz="1800" kern="1200">
-                <a:solidFill>
-                  <a:schemeClr val="tx1"/>
-                </a:solidFill>
-                <a:latin typeface="+mn-lt"/>
-                <a:ea typeface="+mn-ea"/>
-                <a:cs typeface="+mn-cs"/>
-              </a:defRPr>
-            </a:lvl8pPr>
-            <a:lvl9pPr marL="3657600" algn="l" defTabSz="914400" rtl="0" eaLnBrk="1" latinLnBrk="0" hangingPunct="1">
-              <a:defRPr sz="1800" kern="1200">
-                <a:solidFill>
-                  <a:schemeClr val="tx1"/>
-                </a:solidFill>
-                <a:latin typeface="+mn-lt"/>
-                <a:ea typeface="+mn-ea"/>
-                <a:cs typeface="+mn-cs"/>
-              </a:defRPr>
-            </a:lvl9pPr>
-          </a:lstStyle>
-          <a:p>
-            <a:fld id="{C5F86065-5C12-4F8A-8791-CC7ADD0E19AC}" type="slidenum">
-              <a:rPr lang="tr-TR" smtClean="0"/>
-              <a:pPr/>
-              <a:t>12</a:t>
-            </a:fld>
-            <a:endParaRPr lang="tr-TR"/>
           </a:p>
         </p:txBody>
       </p:sp>
@@ -8490,7 +8358,7 @@
             </a:r>
             <a:r>
               <a:rPr lang="en-US" sz="1600" dirty="0" err="1"/>
-              <a:t>cat_number_client_calls_from_ING</a:t>
+              <a:t>cat_number_client_calls_from_BANK</a:t>
             </a:r>
             <a:r>
               <a:rPr lang="en-US" sz="1600" dirty="0"/>
@@ -9273,10 +9141,10 @@
       </p:pic>
       <p:pic>
         <p:nvPicPr>
-          <p:cNvPr id="27" name="Picture 26" descr="A bar graph with text&#10;&#10;Description automatically generated">
-            <a:extLst>
-              <a:ext uri="{FF2B5EF4-FFF2-40B4-BE49-F238E27FC236}">
-                <a16:creationId xmlns:a16="http://schemas.microsoft.com/office/drawing/2014/main" id="{5E0E845E-AF60-638B-A50C-BB36849D1D3B}"/>
+          <p:cNvPr id="3" name="Picture 2">
+            <a:extLst>
+              <a:ext uri="{FF2B5EF4-FFF2-40B4-BE49-F238E27FC236}">
+                <a16:creationId xmlns:a16="http://schemas.microsoft.com/office/drawing/2014/main" id="{FC865B7D-91FC-4939-D594-EA4F7D8CB70B}"/>
               </a:ext>
             </a:extLst>
           </p:cNvPr>
@@ -9286,21 +9154,15 @@
           <p:nvPr/>
         </p:nvPicPr>
         <p:blipFill>
-          <a:blip r:embed="rId5">
-            <a:extLst>
-              <a:ext uri="{28A0092B-C50C-407E-A947-70E740481C1C}">
-                <a14:useLocalDpi xmlns:a14="http://schemas.microsoft.com/office/drawing/2010/main" val="0"/>
-              </a:ext>
-            </a:extLst>
-          </a:blip>
+          <a:blip r:embed="rId5"/>
           <a:stretch>
             <a:fillRect/>
           </a:stretch>
         </p:blipFill>
         <p:spPr>
           <a:xfrm>
-            <a:off x="292611" y="3024627"/>
-            <a:ext cx="7315200" cy="2832100"/>
+            <a:off x="157204" y="3024628"/>
+            <a:ext cx="7741654" cy="2999892"/>
           </a:xfrm>
           <a:prstGeom prst="rect">
             <a:avLst/>
@@ -9877,10 +9739,10 @@
       </p:sp>
       <p:pic>
         <p:nvPicPr>
-          <p:cNvPr id="21" name="Picture 20" descr="A chart with numbers and a yellow and purple squares&#10;&#10;Description automatically generated with medium confidence">
-            <a:extLst>
-              <a:ext uri="{FF2B5EF4-FFF2-40B4-BE49-F238E27FC236}">
-                <a16:creationId xmlns:a16="http://schemas.microsoft.com/office/drawing/2014/main" id="{A3EA2707-F147-C381-51BF-DD247BD7F3F7}"/>
+          <p:cNvPr id="7" name="Picture 6" descr="A graph of a positive label&#10;&#10;Description automatically generated">
+            <a:extLst>
+              <a:ext uri="{FF2B5EF4-FFF2-40B4-BE49-F238E27FC236}">
+                <a16:creationId xmlns:a16="http://schemas.microsoft.com/office/drawing/2014/main" id="{6B02AE01-EE44-D661-4162-DBDCD0A3A5F1}"/>
               </a:ext>
             </a:extLst>
           </p:cNvPr>
@@ -9891,76 +9753,6 @@
         </p:nvPicPr>
         <p:blipFill rotWithShape="1">
           <a:blip r:embed="rId3">
-            <a:extLst>
-              <a:ext uri="{28A0092B-C50C-407E-A947-70E740481C1C}">
-                <a14:useLocalDpi xmlns:a14="http://schemas.microsoft.com/office/drawing/2010/main" val="0"/>
-              </a:ext>
-            </a:extLst>
-          </a:blip>
-          <a:srcRect l="9760" t="10435" r="11313" b="1425"/>
-          <a:stretch/>
-        </p:blipFill>
-        <p:spPr>
-          <a:xfrm>
-            <a:off x="8267086" y="726733"/>
-            <a:ext cx="3376949" cy="2828341"/>
-          </a:xfrm>
-          <a:prstGeom prst="rect">
-            <a:avLst/>
-          </a:prstGeom>
-        </p:spPr>
-      </p:pic>
-      <p:pic>
-        <p:nvPicPr>
-          <p:cNvPr id="4" name="Picture 3" descr="A chart with numbers and labels&#10;&#10;Description automatically generated">
-            <a:extLst>
-              <a:ext uri="{FF2B5EF4-FFF2-40B4-BE49-F238E27FC236}">
-                <a16:creationId xmlns:a16="http://schemas.microsoft.com/office/drawing/2014/main" id="{63EF181E-2E49-80D1-9613-9C010CE1B6EC}"/>
-              </a:ext>
-            </a:extLst>
-          </p:cNvPr>
-          <p:cNvPicPr>
-            <a:picLocks noChangeAspect="1"/>
-          </p:cNvPicPr>
-          <p:nvPr/>
-        </p:nvPicPr>
-        <p:blipFill rotWithShape="1">
-          <a:blip r:embed="rId4">
-            <a:extLst>
-              <a:ext uri="{28A0092B-C50C-407E-A947-70E740481C1C}">
-                <a14:useLocalDpi xmlns:a14="http://schemas.microsoft.com/office/drawing/2010/main" val="0"/>
-              </a:ext>
-            </a:extLst>
-          </a:blip>
-          <a:srcRect l="9926" t="10814" r="10519" b="1426"/>
-          <a:stretch/>
-        </p:blipFill>
-        <p:spPr>
-          <a:xfrm>
-            <a:off x="8267087" y="757186"/>
-            <a:ext cx="3381736" cy="2797885"/>
-          </a:xfrm>
-          <a:prstGeom prst="rect">
-            <a:avLst/>
-          </a:prstGeom>
-        </p:spPr>
-      </p:pic>
-      <p:pic>
-        <p:nvPicPr>
-          <p:cNvPr id="7" name="Picture 6" descr="A graph of a positive label&#10;&#10;Description automatically generated">
-            <a:extLst>
-              <a:ext uri="{FF2B5EF4-FFF2-40B4-BE49-F238E27FC236}">
-                <a16:creationId xmlns:a16="http://schemas.microsoft.com/office/drawing/2014/main" id="{6B02AE01-EE44-D661-4162-DBDCD0A3A5F1}"/>
-              </a:ext>
-            </a:extLst>
-          </p:cNvPr>
-          <p:cNvPicPr>
-            <a:picLocks noChangeAspect="1"/>
-          </p:cNvPicPr>
-          <p:nvPr/>
-        </p:nvPicPr>
-        <p:blipFill rotWithShape="1">
-          <a:blip r:embed="rId5">
             <a:extLst>
               <a:ext uri="{28A0092B-C50C-407E-A947-70E740481C1C}">
                 <a14:useLocalDpi xmlns:a14="http://schemas.microsoft.com/office/drawing/2010/main" val="0"/>
@@ -9982,10 +9774,10 @@
       </p:pic>
       <p:pic>
         <p:nvPicPr>
-          <p:cNvPr id="9" name="Picture 8" descr="A bar graph with text&#10;&#10;Description automatically generated">
-            <a:extLst>
-              <a:ext uri="{FF2B5EF4-FFF2-40B4-BE49-F238E27FC236}">
-                <a16:creationId xmlns:a16="http://schemas.microsoft.com/office/drawing/2014/main" id="{6CE9F9D9-7D61-A7BF-2B08-85A0DC0401D5}"/>
+          <p:cNvPr id="3" name="Picture 2">
+            <a:extLst>
+              <a:ext uri="{FF2B5EF4-FFF2-40B4-BE49-F238E27FC236}">
+                <a16:creationId xmlns:a16="http://schemas.microsoft.com/office/drawing/2014/main" id="{21FB9742-9DDD-5C5E-2D2E-83E499054880}"/>
               </a:ext>
             </a:extLst>
           </p:cNvPr>
@@ -9995,21 +9787,44 @@
           <p:nvPr/>
         </p:nvPicPr>
         <p:blipFill>
-          <a:blip r:embed="rId6">
-            <a:extLst>
-              <a:ext uri="{28A0092B-C50C-407E-A947-70E740481C1C}">
-                <a14:useLocalDpi xmlns:a14="http://schemas.microsoft.com/office/drawing/2010/main" val="0"/>
-              </a:ext>
-            </a:extLst>
-          </a:blip>
+          <a:blip r:embed="rId4"/>
           <a:stretch>
             <a:fillRect/>
           </a:stretch>
         </p:blipFill>
         <p:spPr>
           <a:xfrm>
-            <a:off x="292611" y="3268714"/>
-            <a:ext cx="7315200" cy="2832100"/>
+            <a:off x="292611" y="3429000"/>
+            <a:ext cx="7450606" cy="2887110"/>
+          </a:xfrm>
+          <a:prstGeom prst="rect">
+            <a:avLst/>
+          </a:prstGeom>
+        </p:spPr>
+      </p:pic>
+      <p:pic>
+        <p:nvPicPr>
+          <p:cNvPr id="6" name="Picture 5">
+            <a:extLst>
+              <a:ext uri="{FF2B5EF4-FFF2-40B4-BE49-F238E27FC236}">
+                <a16:creationId xmlns:a16="http://schemas.microsoft.com/office/drawing/2014/main" id="{3C88C8D9-EF41-F72B-DCA2-CBE5F6209BE1}"/>
+              </a:ext>
+            </a:extLst>
+          </p:cNvPr>
+          <p:cNvPicPr>
+            <a:picLocks noChangeAspect="1"/>
+          </p:cNvPicPr>
+          <p:nvPr/>
+        </p:nvPicPr>
+        <p:blipFill rotWithShape="1">
+          <a:blip r:embed="rId5"/>
+          <a:srcRect l="10323" t="11230" r="11199" b="1609"/>
+          <a:stretch/>
+        </p:blipFill>
+        <p:spPr>
+          <a:xfrm>
+            <a:off x="8267086" y="757186"/>
+            <a:ext cx="3376949" cy="2812975"/>
           </a:xfrm>
           <a:prstGeom prst="rect">
             <a:avLst/>
@@ -14071,7 +13886,7 @@
             </a:r>
             <a:r>
               <a:rPr lang="en-US" sz="1600" dirty="0" err="1"/>
-              <a:t>number_client_calls_to_ING</a:t>
+              <a:t>number_client_calls_to_BANK</a:t>
             </a:r>
             <a:r>
               <a:rPr lang="en-US" sz="1600" dirty="0"/>
@@ -14079,7 +13894,7 @@
             </a:r>
             <a:r>
               <a:rPr lang="en-US" sz="1600" dirty="0" err="1"/>
-              <a:t>number_client_calls_from_ING</a:t>
+              <a:t>number_client_calls_from_BANK</a:t>
             </a:r>
             <a:r>
               <a:rPr lang="en-US" sz="1600" dirty="0"/>
@@ -14104,10 +13919,10 @@
       </p:sp>
       <p:pic>
         <p:nvPicPr>
-          <p:cNvPr id="4" name="Picture 3">
-            <a:extLst>
-              <a:ext uri="{FF2B5EF4-FFF2-40B4-BE49-F238E27FC236}">
-                <a16:creationId xmlns:a16="http://schemas.microsoft.com/office/drawing/2014/main" id="{3C87614A-962B-3766-7A61-CABAF18AB948}"/>
+          <p:cNvPr id="6" name="Picture 5">
+            <a:extLst>
+              <a:ext uri="{FF2B5EF4-FFF2-40B4-BE49-F238E27FC236}">
+                <a16:creationId xmlns:a16="http://schemas.microsoft.com/office/drawing/2014/main" id="{8DA07BAF-0513-9723-8C76-AF8B00F16472}"/>
               </a:ext>
             </a:extLst>
           </p:cNvPr>
@@ -14124,8 +13939,8 @@
         </p:blipFill>
         <p:spPr>
           <a:xfrm>
-            <a:off x="1527371" y="2556364"/>
-            <a:ext cx="8638034" cy="4301636"/>
+            <a:off x="1527370" y="2556363"/>
+            <a:ext cx="8455725" cy="4210849"/>
           </a:xfrm>
           <a:prstGeom prst="rect">
             <a:avLst/>
@@ -14528,7 +14343,7 @@
             </a:r>
             <a:r>
               <a:rPr lang="en-US" sz="1600" dirty="0" err="1"/>
-              <a:t>number_client_calls_from_ING</a:t>
+              <a:t>number_client_calls_from_BANK</a:t>
             </a:r>
             <a:r>
               <a:rPr lang="en-US" sz="1600" dirty="0"/>
@@ -14561,10 +14376,10 @@
       </p:sp>
       <p:pic>
         <p:nvPicPr>
-          <p:cNvPr id="4" name="Picture 3">
-            <a:extLst>
-              <a:ext uri="{FF2B5EF4-FFF2-40B4-BE49-F238E27FC236}">
-                <a16:creationId xmlns:a16="http://schemas.microsoft.com/office/drawing/2014/main" id="{8EDD599C-DC6C-2E5D-EC1E-F5C619D450D5}"/>
+          <p:cNvPr id="5" name="Picture 4">
+            <a:extLst>
+              <a:ext uri="{FF2B5EF4-FFF2-40B4-BE49-F238E27FC236}">
+                <a16:creationId xmlns:a16="http://schemas.microsoft.com/office/drawing/2014/main" id="{AE538C45-2FB0-8784-C37B-3A0261561C15}"/>
               </a:ext>
             </a:extLst>
           </p:cNvPr>
@@ -14581,8 +14396,8 @@
         </p:blipFill>
         <p:spPr>
           <a:xfrm>
-            <a:off x="157203" y="1483592"/>
-            <a:ext cx="8539003" cy="4239465"/>
+            <a:off x="155814" y="1483590"/>
+            <a:ext cx="8452313" cy="4196425"/>
           </a:xfrm>
           <a:prstGeom prst="rect">
             <a:avLst/>

</xml_diff>